<commit_message>
Actualizar readme y presentación
Falta poner bonita la presentación
</commit_message>
<xml_diff>
--- a/Presentacion_CineData.pptx
+++ b/Presentacion_CineData.pptx
@@ -4928,7 +4928,25 @@
               </a:defRPr>
             </a:pPr>
             <a:r>
-              <a:t>🏗️ TIPO DE ARQUITECTURA: MICROSERVICIOS</a:t>
+              <a:t>🏗️ TIPO DE ARQUITECTURA: MICROSERVICIOS CON API GATEWAY</a:t>
+            </a:r>
+          </a:p>
+          <a:p>
+            <a:pPr>
+              <a:spcBef>
+                <a:spcPts val="400"/>
+              </a:spcBef>
+              <a:spcAft>
+                <a:spcPts val="400"/>
+              </a:spcAft>
+              <a:defRPr sz="1500">
+                <a:solidFill>
+                  <a:srgbClr val="323232"/>
+                </a:solidFill>
+              </a:defRPr>
+            </a:pPr>
+            <a:r>
+              <a:t>  • API Gateway centralizado (Express.js en Node.js)</a:t>
             </a:r>
           </a:p>
           <a:p>
@@ -5051,7 +5069,25 @@
               </a:defRPr>
             </a:pPr>
             <a:r>
-              <a:t>  Backend 1: FastAPI + Motor (async MongoDB driver) en Python</a:t>
+              <a:t>  API Gateway: Express.js en Node.js (puerto 8080)</a:t>
+            </a:r>
+          </a:p>
+          <a:p>
+            <a:pPr>
+              <a:spcBef>
+                <a:spcPts val="400"/>
+              </a:spcBef>
+              <a:spcAft>
+                <a:spcPts val="400"/>
+              </a:spcAft>
+              <a:defRPr sz="1500">
+                <a:solidFill>
+                  <a:srgbClr val="323232"/>
+                </a:solidFill>
+              </a:defRPr>
+            </a:pPr>
+            <a:r>
+              <a:t>  Backend 1: FastAPI + Motor (async MongoDB) en Python</a:t>
             </a:r>
           </a:p>
           <a:p>
@@ -5138,6 +5174,147 @@
               </a:defRPr>
             </a:pPr>
             <a:r>
+              <a:t>🌐 API GATEWAY - PUNTO DE ENTRADA ÚNICO:</a:t>
+            </a:r>
+          </a:p>
+          <a:p>
+            <a:pPr>
+              <a:spcBef>
+                <a:spcPts val="400"/>
+              </a:spcBef>
+              <a:spcAft>
+                <a:spcPts val="400"/>
+              </a:spcAft>
+              <a:defRPr sz="1500">
+                <a:solidFill>
+                  <a:srgbClr val="323232"/>
+                </a:solidFill>
+              </a:defRPr>
+            </a:pPr>
+            <a:r>
+              <a:t>  • Autenticación JWT centralizada</a:t>
+            </a:r>
+          </a:p>
+          <a:p>
+            <a:pPr>
+              <a:spcBef>
+                <a:spcPts val="400"/>
+              </a:spcBef>
+              <a:spcAft>
+                <a:spcPts val="400"/>
+              </a:spcAft>
+              <a:defRPr sz="1500">
+                <a:solidFill>
+                  <a:srgbClr val="323232"/>
+                </a:solidFill>
+              </a:defRPr>
+            </a:pPr>
+            <a:r>
+              <a:t>  • Proxy inverso inteligente hacia servicios backend</a:t>
+            </a:r>
+          </a:p>
+          <a:p>
+            <a:pPr>
+              <a:spcBef>
+                <a:spcPts val="400"/>
+              </a:spcBef>
+              <a:spcAft>
+                <a:spcPts val="400"/>
+              </a:spcAft>
+              <a:defRPr sz="1500">
+                <a:solidFill>
+                  <a:srgbClr val="323232"/>
+                </a:solidFill>
+              </a:defRPr>
+            </a:pPr>
+            <a:r>
+              <a:t>  • Mapeo de rutas: /auth/* → /users/* (users service)</a:t>
+            </a:r>
+          </a:p>
+          <a:p>
+            <a:pPr>
+              <a:spcBef>
+                <a:spcPts val="400"/>
+              </a:spcBef>
+              <a:spcAft>
+                <a:spcPts val="400"/>
+              </a:spcAft>
+              <a:defRPr sz="1500">
+                <a:solidFill>
+                  <a:srgbClr val="323232"/>
+                </a:solidFill>
+              </a:defRPr>
+            </a:pPr>
+            <a:r>
+              <a:t>  • Manejo de rutas públicas y protegidas</a:t>
+            </a:r>
+          </a:p>
+          <a:p>
+            <a:pPr>
+              <a:spcBef>
+                <a:spcPts val="400"/>
+              </a:spcBef>
+              <a:spcAft>
+                <a:spcPts val="400"/>
+              </a:spcAft>
+              <a:defRPr sz="1500">
+                <a:solidFill>
+                  <a:srgbClr val="323232"/>
+                </a:solidFill>
+              </a:defRPr>
+            </a:pPr>
+            <a:r>
+              <a:t>  • Logging centralizado con Morgan</a:t>
+            </a:r>
+          </a:p>
+          <a:p>
+            <a:pPr>
+              <a:spcBef>
+                <a:spcPts val="400"/>
+              </a:spcBef>
+              <a:spcAft>
+                <a:spcPts val="400"/>
+              </a:spcAft>
+              <a:defRPr sz="1500">
+                <a:solidFill>
+                  <a:srgbClr val="323232"/>
+                </a:solidFill>
+              </a:defRPr>
+            </a:pPr>
+            <a:r>
+              <a:t>  • CORS configurado para frontend</a:t>
+            </a:r>
+          </a:p>
+          <a:p>
+            <a:pPr>
+              <a:spcBef>
+                <a:spcPts val="400"/>
+              </a:spcBef>
+              <a:spcAft>
+                <a:spcPts val="400"/>
+              </a:spcAft>
+              <a:defRPr sz="1500">
+                <a:solidFill>
+                  <a:srgbClr val="323232"/>
+                </a:solidFill>
+              </a:defRPr>
+            </a:pPr>
+          </a:p>
+          <a:p>
+            <a:pPr>
+              <a:spcBef>
+                <a:spcPts val="400"/>
+              </a:spcBef>
+              <a:spcAft>
+                <a:spcPts val="400"/>
+              </a:spcAft>
+              <a:defRPr sz="1500">
+                <a:solidFill>
+                  <a:srgbClr val="323232"/>
+                </a:solidFill>
+              </a:defRPr>
+            </a:pPr>
+            <a:r>
               <a:t>📱 ARQUITECTURA DE FRONTEND:</a:t>
             </a:r>
           </a:p>
@@ -5174,6 +5351,24 @@
               </a:defRPr>
             </a:pPr>
             <a:r>
+              <a:t>  • CSR (Client-Side Rendering)</a:t>
+            </a:r>
+          </a:p>
+          <a:p>
+            <a:pPr>
+              <a:spcBef>
+                <a:spcPts val="400"/>
+              </a:spcBef>
+              <a:spcAft>
+                <a:spcPts val="400"/>
+              </a:spcAft>
+              <a:defRPr sz="1500">
+                <a:solidFill>
+                  <a:srgbClr val="323232"/>
+                </a:solidFill>
+              </a:defRPr>
+            </a:pPr>
+            <a:r>
               <a:t>  • Enrutamiento con React Router v7</a:t>
             </a:r>
           </a:p>
@@ -5192,130 +5387,58 @@
               </a:defRPr>
             </a:pPr>
             <a:r>
-              <a:t>  • CSR (Client-Side Rendering) - renderizado en el navegador</a:t>
-            </a:r>
-          </a:p>
-          <a:p>
-            <a:pPr>
-              <a:spcBef>
-                <a:spcPts val="400"/>
-              </a:spcBef>
-              <a:spcAft>
-                <a:spcPts val="400"/>
-              </a:spcAft>
-              <a:defRPr sz="1500">
-                <a:solidFill>
-                  <a:srgbClr val="323232"/>
-                </a:solidFill>
-              </a:defRPr>
-            </a:pPr>
-            <a:r>
-              <a:t>  • HTML5 con uso extensivo de JavaScript/JSX</a:t>
-            </a:r>
-          </a:p>
-          <a:p>
-            <a:pPr>
-              <a:spcBef>
-                <a:spcPts val="400"/>
-              </a:spcBef>
-              <a:spcAft>
-                <a:spcPts val="400"/>
-              </a:spcAft>
-              <a:defRPr sz="1500">
-                <a:solidFill>
-                  <a:srgbClr val="323232"/>
-                </a:solidFill>
-              </a:defRPr>
-            </a:pPr>
-            <a:r>
-              <a:t>  • NO multipage, NO PWA, NO subida a la nube</a:t>
-            </a:r>
-          </a:p>
-          <a:p>
-            <a:pPr>
-              <a:spcBef>
-                <a:spcPts val="400"/>
-              </a:spcBef>
-              <a:spcAft>
-                <a:spcPts val="400"/>
-              </a:spcAft>
-              <a:defRPr sz="1500">
-                <a:solidFill>
-                  <a:srgbClr val="323232"/>
-                </a:solidFill>
-              </a:defRPr>
-            </a:pPr>
-          </a:p>
-          <a:p>
-            <a:pPr>
-              <a:spcBef>
-                <a:spcPts val="400"/>
-              </a:spcBef>
-              <a:spcAft>
-                <a:spcPts val="400"/>
-              </a:spcAft>
-              <a:defRPr sz="1500">
-                <a:solidFill>
-                  <a:srgbClr val="323232"/>
-                </a:solidFill>
-              </a:defRPr>
-            </a:pPr>
-            <a:r>
-              <a:t>🔌 INTEGRACIÓN:</a:t>
-            </a:r>
-          </a:p>
-          <a:p>
-            <a:pPr>
-              <a:spcBef>
-                <a:spcPts val="400"/>
-              </a:spcBef>
-              <a:spcAft>
-                <a:spcPts val="400"/>
-              </a:spcAft>
-              <a:defRPr sz="1500">
-                <a:solidFill>
-                  <a:srgbClr val="323232"/>
-                </a:solidFill>
-              </a:defRPr>
-            </a:pPr>
-            <a:r>
-              <a:t>  • NO hay API Gateway (comunicación directa cliente-servidor)</a:t>
-            </a:r>
-          </a:p>
-          <a:p>
-            <a:pPr>
-              <a:spcBef>
-                <a:spcPts val="400"/>
-              </a:spcBef>
-              <a:spcAft>
-                <a:spcPts val="400"/>
-              </a:spcAft>
-              <a:defRPr sz="1500">
-                <a:solidFill>
-                  <a:srgbClr val="323232"/>
-                </a:solidFill>
-              </a:defRPr>
-            </a:pPr>
-            <a:r>
-              <a:t>  • Múltiples endpoints en diferentes puertos</a:t>
-            </a:r>
-          </a:p>
-          <a:p>
-            <a:pPr>
-              <a:spcBef>
-                <a:spcPts val="400"/>
-              </a:spcBef>
-              <a:spcAft>
-                <a:spcPts val="400"/>
-              </a:spcAft>
-              <a:defRPr sz="1500">
-                <a:solidFill>
-                  <a:srgbClr val="323232"/>
-                </a:solidFill>
-              </a:defRPr>
-            </a:pPr>
-            <a:r>
-              <a:t>  • CORS habilitado en ambos backends</a:t>
+              <a:t>  • Comunicación con gateway en puerto 8080</a:t>
+            </a:r>
+          </a:p>
+          <a:p>
+            <a:pPr>
+              <a:spcBef>
+                <a:spcPts val="400"/>
+              </a:spcBef>
+              <a:spcAft>
+                <a:spcPts val="400"/>
+              </a:spcAft>
+              <a:defRPr sz="1500">
+                <a:solidFill>
+                  <a:srgbClr val="323232"/>
+                </a:solidFill>
+              </a:defRPr>
+            </a:pPr>
+          </a:p>
+          <a:p>
+            <a:pPr>
+              <a:spcBef>
+                <a:spcPts val="400"/>
+              </a:spcBef>
+              <a:spcAft>
+                <a:spcPts val="400"/>
+              </a:spcAft>
+              <a:defRPr sz="1500">
+                <a:solidFill>
+                  <a:srgbClr val="323232"/>
+                </a:solidFill>
+              </a:defRPr>
+            </a:pPr>
+            <a:r>
+              <a:t>🔌 FLUJO DE COMUNICACIÓN:</a:t>
+            </a:r>
+          </a:p>
+          <a:p>
+            <a:pPr>
+              <a:spcBef>
+                <a:spcPts val="400"/>
+              </a:spcBef>
+              <a:spcAft>
+                <a:spcPts val="400"/>
+              </a:spcAft>
+              <a:defRPr sz="1500">
+                <a:solidFill>
+                  <a:srgbClr val="323232"/>
+                </a:solidFill>
+              </a:defRPr>
+            </a:pPr>
+            <a:r>
+              <a:t>  Frontend (5173) → API Gateway (8080) → Servicios (8000, 3001)</a:t>
             </a:r>
           </a:p>
         </p:txBody>
@@ -5498,7 +5621,7 @@
               </a:defRPr>
             </a:pPr>
             <a:r>
-              <a:t>  • Orquestación compleja con Docker Compose</a:t>
+              <a:t>  • Orquestación compleja con Docker Compose (6 contenedores)</a:t>
             </a:r>
           </a:p>
           <a:p>
@@ -5533,6 +5656,24 @@
                 </a:solidFill>
               </a:defRPr>
             </a:pPr>
+            <a:r>
+              <a:t>  • Implementación de API Gateway para centralizar autenticación</a:t>
+            </a:r>
+          </a:p>
+          <a:p>
+            <a:pPr>
+              <a:spcBef>
+                <a:spcPts val="400"/>
+              </a:spcBef>
+              <a:spcAft>
+                <a:spcPts val="400"/>
+              </a:spcAft>
+              <a:defRPr sz="1500">
+                <a:solidFill>
+                  <a:srgbClr val="323232"/>
+                </a:solidFill>
+              </a:defRPr>
+            </a:pPr>
           </a:p>
           <a:p>
             <a:pPr>
@@ -5567,6 +5708,42 @@
               </a:defRPr>
             </a:pPr>
             <a:r>
+              <a:t>  • API Gateway con proxy inverso inteligente (express-http-proxy)</a:t>
+            </a:r>
+          </a:p>
+          <a:p>
+            <a:pPr>
+              <a:spcBef>
+                <a:spcPts val="400"/>
+              </a:spcBef>
+              <a:spcAft>
+                <a:spcPts val="400"/>
+              </a:spcAft>
+              <a:defRPr sz="1500">
+                <a:solidFill>
+                  <a:srgbClr val="323232"/>
+                </a:solidFill>
+              </a:defRPr>
+            </a:pPr>
+            <a:r>
+              <a:t>  • Mapeo de rutas y validación centralizada de JWT</a:t>
+            </a:r>
+          </a:p>
+          <a:p>
+            <a:pPr>
+              <a:spcBef>
+                <a:spcPts val="400"/>
+              </a:spcBef>
+              <a:spcAft>
+                <a:spcPts val="400"/>
+              </a:spcAft>
+              <a:defRPr sz="1500">
+                <a:solidFill>
+                  <a:srgbClr val="323232"/>
+                </a:solidFill>
+              </a:defRPr>
+            </a:pPr>
+            <a:r>
               <a:t>  • Async/await en FastAPI: operaciones no-bloqueantes</a:t>
             </a:r>
           </a:p>
@@ -5621,7 +5798,7 @@
               </a:defRPr>
             </a:pPr>
             <a:r>
-              <a:t>  • CORS configurado en ambos backends para seguridad</a:t>
+              <a:t>  • CORS configurado en gateway y backends para seguridad</a:t>
             </a:r>
           </a:p>
           <a:p>
@@ -5744,79 +5921,79 @@
               </a:defRPr>
             </a:pPr>
             <a:r>
-              <a:t>  ✅ Sistema COMPLETO y FUNCIONAL (Full-Stack)</a:t>
-            </a:r>
-          </a:p>
-          <a:p>
-            <a:pPr>
-              <a:spcBef>
-                <a:spcPts val="400"/>
-              </a:spcBef>
-              <a:spcAft>
-                <a:spcPts val="400"/>
-              </a:spcAft>
-              <a:defRPr sz="1500">
-                <a:solidFill>
-                  <a:srgbClr val="323232"/>
-                </a:solidFill>
-              </a:defRPr>
-            </a:pPr>
-            <a:r>
-              <a:t>  ✅ Arquitectura PROFESIONAL con separación de responsabilidades</a:t>
-            </a:r>
-          </a:p>
-          <a:p>
-            <a:pPr>
-              <a:spcBef>
-                <a:spcPts val="400"/>
-              </a:spcBef>
-              <a:spcAft>
-                <a:spcPts val="400"/>
-              </a:spcAft>
-              <a:defRPr sz="1500">
-                <a:solidFill>
-                  <a:srgbClr val="323232"/>
-                </a:solidFill>
-              </a:defRPr>
-            </a:pPr>
-            <a:r>
-              <a:t>  ✅ SEGURIDAD implementada en múltiples niveles</a:t>
-            </a:r>
-          </a:p>
-          <a:p>
-            <a:pPr>
-              <a:spcBef>
-                <a:spcPts val="400"/>
-              </a:spcBef>
-              <a:spcAft>
-                <a:spcPts val="400"/>
-              </a:spcAft>
-              <a:defRPr sz="1500">
-                <a:solidFill>
-                  <a:srgbClr val="323232"/>
-                </a:solidFill>
-              </a:defRPr>
-            </a:pPr>
-            <a:r>
-              <a:t>  ✅ Uso de BUENAS PRÁCTICAS y patrones de diseño</a:t>
-            </a:r>
-          </a:p>
-          <a:p>
-            <a:pPr>
-              <a:spcBef>
-                <a:spcPts val="400"/>
-              </a:spcBef>
-              <a:spcAft>
-                <a:spcPts val="400"/>
-              </a:spcAft>
-              <a:defRPr sz="1500">
-                <a:solidFill>
-                  <a:srgbClr val="323232"/>
-                </a:solidFill>
-              </a:defRPr>
-            </a:pPr>
-            <a:r>
-              <a:t>  ✅ ESCALABLE y MANTENIBLE para futuros cambios</a:t>
+              <a:t>  ✅ Sistema COMPLETO y FUNCIONAL (Full-Stack + Gateway)</a:t>
+            </a:r>
+          </a:p>
+          <a:p>
+            <a:pPr>
+              <a:spcBef>
+                <a:spcPts val="400"/>
+              </a:spcBef>
+              <a:spcAft>
+                <a:spcPts val="400"/>
+              </a:spcAft>
+              <a:defRPr sz="1500">
+                <a:solidFill>
+                  <a:srgbClr val="323232"/>
+                </a:solidFill>
+              </a:defRPr>
+            </a:pPr>
+            <a:r>
+              <a:t>  ✅ Arquitectura PROFESIONAL (3-tier con API Gateway)</a:t>
+            </a:r>
+          </a:p>
+          <a:p>
+            <a:pPr>
+              <a:spcBef>
+                <a:spcPts val="400"/>
+              </a:spcBef>
+              <a:spcAft>
+                <a:spcPts val="400"/>
+              </a:spcAft>
+              <a:defRPr sz="1500">
+                <a:solidFill>
+                  <a:srgbClr val="323232"/>
+                </a:solidFill>
+              </a:defRPr>
+            </a:pPr>
+            <a:r>
+              <a:t>  ✅ SEGURIDAD en múltiples niveles (JWT + RBAC + CORS)</a:t>
+            </a:r>
+          </a:p>
+          <a:p>
+            <a:pPr>
+              <a:spcBef>
+                <a:spcPts val="400"/>
+              </a:spcBef>
+              <a:spcAft>
+                <a:spcPts val="400"/>
+              </a:spcAft>
+              <a:defRPr sz="1500">
+                <a:solidFill>
+                  <a:srgbClr val="323232"/>
+                </a:solidFill>
+              </a:defRPr>
+            </a:pPr>
+            <a:r>
+              <a:t>  ✅ BUENAS PRÁCTICAS y patrones de diseño actuales</a:t>
+            </a:r>
+          </a:p>
+          <a:p>
+            <a:pPr>
+              <a:spcBef>
+                <a:spcPts val="400"/>
+              </a:spcBef>
+              <a:spcAft>
+                <a:spcPts val="400"/>
+              </a:spcAft>
+              <a:defRPr sz="1500">
+                <a:solidFill>
+                  <a:srgbClr val="323232"/>
+                </a:solidFill>
+              </a:defRPr>
+            </a:pPr>
+            <a:r>
+              <a:t>  ✅ ESCALABLE y MANTENIBLE para producción</a:t>
             </a:r>
           </a:p>
           <a:p>

</xml_diff>

<commit_message>
Actualizar presentación y Readme e incluir el vídeo
Meter capturas en la presentación y el enlace al vídeo
</commit_message>
<xml_diff>
--- a/Presentacion_CineData.pptx
+++ b/Presentacion_CineData.pptx
@@ -14,7 +14,12 @@
     <p:sldId id="261" r:id="rId8"/>
     <p:sldId id="264" r:id="rId9"/>
     <p:sldId id="262" r:id="rId10"/>
-    <p:sldId id="265" r:id="rId11"/>
+    <p:sldId id="266" r:id="rId11"/>
+    <p:sldId id="268" r:id="rId12"/>
+    <p:sldId id="271" r:id="rId13"/>
+    <p:sldId id="269" r:id="rId14"/>
+    <p:sldId id="272" r:id="rId15"/>
+    <p:sldId id="265" r:id="rId16"/>
   </p:sldIdLst>
   <p:sldSz cx="9144000" cy="6858000" type="screen4x3"/>
   <p:notesSz cx="6858000" cy="9144000"/>
@@ -311,7 +316,7 @@
           <a:p>
             <a:fld id="{5BCAD085-E8A6-8845-BD4E-CB4CCA059FC4}" type="datetimeFigureOut">
               <a:rPr lang="en-US" smtClean="0"/>
-              <a:t>1/1/2026</a:t>
+              <a:t>1/2/2026</a:t>
             </a:fld>
             <a:endParaRPr lang="en-US"/>
           </a:p>
@@ -479,7 +484,7 @@
           <a:p>
             <a:fld id="{5BCAD085-E8A6-8845-BD4E-CB4CCA059FC4}" type="datetimeFigureOut">
               <a:rPr lang="en-US" smtClean="0"/>
-              <a:t>1/1/2026</a:t>
+              <a:t>1/2/2026</a:t>
             </a:fld>
             <a:endParaRPr lang="en-US"/>
           </a:p>
@@ -657,7 +662,7 @@
           <a:p>
             <a:fld id="{5BCAD085-E8A6-8845-BD4E-CB4CCA059FC4}" type="datetimeFigureOut">
               <a:rPr lang="en-US" smtClean="0"/>
-              <a:t>1/1/2026</a:t>
+              <a:t>1/2/2026</a:t>
             </a:fld>
             <a:endParaRPr lang="en-US"/>
           </a:p>
@@ -825,7 +830,7 @@
           <a:p>
             <a:fld id="{5BCAD085-E8A6-8845-BD4E-CB4CCA059FC4}" type="datetimeFigureOut">
               <a:rPr lang="en-US" smtClean="0"/>
-              <a:t>1/1/2026</a:t>
+              <a:t>1/2/2026</a:t>
             </a:fld>
             <a:endParaRPr lang="en-US"/>
           </a:p>
@@ -1070,7 +1075,7 @@
           <a:p>
             <a:fld id="{5BCAD085-E8A6-8845-BD4E-CB4CCA059FC4}" type="datetimeFigureOut">
               <a:rPr lang="en-US" smtClean="0"/>
-              <a:t>1/1/2026</a:t>
+              <a:t>1/2/2026</a:t>
             </a:fld>
             <a:endParaRPr lang="en-US"/>
           </a:p>
@@ -1355,7 +1360,7 @@
           <a:p>
             <a:fld id="{5BCAD085-E8A6-8845-BD4E-CB4CCA059FC4}" type="datetimeFigureOut">
               <a:rPr lang="en-US" smtClean="0"/>
-              <a:t>1/1/2026</a:t>
+              <a:t>1/2/2026</a:t>
             </a:fld>
             <a:endParaRPr lang="en-US"/>
           </a:p>
@@ -1774,7 +1779,7 @@
           <a:p>
             <a:fld id="{5BCAD085-E8A6-8845-BD4E-CB4CCA059FC4}" type="datetimeFigureOut">
               <a:rPr lang="en-US" smtClean="0"/>
-              <a:t>1/1/2026</a:t>
+              <a:t>1/2/2026</a:t>
             </a:fld>
             <a:endParaRPr lang="en-US"/>
           </a:p>
@@ -1891,7 +1896,7 @@
           <a:p>
             <a:fld id="{5BCAD085-E8A6-8845-BD4E-CB4CCA059FC4}" type="datetimeFigureOut">
               <a:rPr lang="en-US" smtClean="0"/>
-              <a:t>1/1/2026</a:t>
+              <a:t>1/2/2026</a:t>
             </a:fld>
             <a:endParaRPr lang="en-US"/>
           </a:p>
@@ -1986,7 +1991,7 @@
           <a:p>
             <a:fld id="{5BCAD085-E8A6-8845-BD4E-CB4CCA059FC4}" type="datetimeFigureOut">
               <a:rPr lang="en-US" smtClean="0"/>
-              <a:t>1/1/2026</a:t>
+              <a:t>1/2/2026</a:t>
             </a:fld>
             <a:endParaRPr lang="en-US"/>
           </a:p>
@@ -2261,7 +2266,7 @@
           <a:p>
             <a:fld id="{5BCAD085-E8A6-8845-BD4E-CB4CCA059FC4}" type="datetimeFigureOut">
               <a:rPr lang="en-US" smtClean="0"/>
-              <a:t>1/1/2026</a:t>
+              <a:t>1/2/2026</a:t>
             </a:fld>
             <a:endParaRPr lang="en-US"/>
           </a:p>
@@ -2513,7 +2518,7 @@
           <a:p>
             <a:fld id="{5BCAD085-E8A6-8845-BD4E-CB4CCA059FC4}" type="datetimeFigureOut">
               <a:rPr lang="en-US" smtClean="0"/>
-              <a:t>1/1/2026</a:t>
+              <a:t>1/2/2026</a:t>
             </a:fld>
             <a:endParaRPr lang="en-US"/>
           </a:p>
@@ -2724,7 +2729,7 @@
           <a:p>
             <a:fld id="{5BCAD085-E8A6-8845-BD4E-CB4CCA059FC4}" type="datetimeFigureOut">
               <a:rPr lang="en-US" smtClean="0"/>
-              <a:t>1/1/2026</a:t>
+              <a:t>1/2/2026</a:t>
             </a:fld>
             <a:endParaRPr lang="en-US"/>
           </a:p>
@@ -3229,6 +3234,1016 @@
         <p:cNvPr id="1" name="">
           <a:extLst>
             <a:ext uri="{FF2B5EF4-FFF2-40B4-BE49-F238E27FC236}">
+              <a16:creationId xmlns:a16="http://schemas.microsoft.com/office/drawing/2014/main" id="{85888B1F-D4C8-762D-1E47-DB7279687C5C}"/>
+            </a:ext>
+          </a:extLst>
+        </p:cNvPr>
+        <p:cNvGrpSpPr/>
+        <p:nvPr/>
+      </p:nvGrpSpPr>
+      <p:grpSpPr>
+        <a:xfrm>
+          <a:off x="0" y="0"/>
+          <a:ext cx="0" cy="0"/>
+          <a:chOff x="0" y="0"/>
+          <a:chExt cx="0" cy="0"/>
+        </a:xfrm>
+      </p:grpSpPr>
+      <p:sp>
+        <p:nvSpPr>
+          <p:cNvPr id="2" name="Rectangle 1">
+            <a:extLst>
+              <a:ext uri="{FF2B5EF4-FFF2-40B4-BE49-F238E27FC236}">
+                <a16:creationId xmlns:a16="http://schemas.microsoft.com/office/drawing/2014/main" id="{94D663F8-A7AB-237D-7804-F83D08B8DA59}"/>
+              </a:ext>
+            </a:extLst>
+          </p:cNvPr>
+          <p:cNvSpPr/>
+          <p:nvPr/>
+        </p:nvSpPr>
+        <p:spPr>
+          <a:xfrm>
+            <a:off x="0" y="0"/>
+            <a:ext cx="9144000" cy="914400"/>
+          </a:xfrm>
+          <a:prstGeom prst="rect">
+            <a:avLst/>
+          </a:prstGeom>
+          <a:solidFill>
+            <a:srgbClr val="1F4E79"/>
+          </a:solidFill>
+          <a:ln>
+            <a:solidFill>
+              <a:srgbClr val="1F4E79"/>
+            </a:solidFill>
+          </a:ln>
+        </p:spPr>
+        <p:style>
+          <a:lnRef idx="1">
+            <a:schemeClr val="accent1"/>
+          </a:lnRef>
+          <a:fillRef idx="3">
+            <a:schemeClr val="accent1"/>
+          </a:fillRef>
+          <a:effectRef idx="2">
+            <a:schemeClr val="accent1"/>
+          </a:effectRef>
+          <a:fontRef idx="minor">
+            <a:schemeClr val="lt1"/>
+          </a:fontRef>
+        </p:style>
+        <p:txBody>
+          <a:bodyPr rtlCol="0" anchor="ctr"/>
+          <a:lstStyle/>
+          <a:p>
+            <a:pPr algn="ctr"/>
+            <a:endParaRPr lang="es-ES" noProof="0" dirty="0"/>
+          </a:p>
+        </p:txBody>
+      </p:sp>
+      <p:sp>
+        <p:nvSpPr>
+          <p:cNvPr id="3" name="TextBox 2">
+            <a:extLst>
+              <a:ext uri="{FF2B5EF4-FFF2-40B4-BE49-F238E27FC236}">
+                <a16:creationId xmlns:a16="http://schemas.microsoft.com/office/drawing/2014/main" id="{478EC842-9F23-D642-0771-6D649C4E3BEC}"/>
+              </a:ext>
+            </a:extLst>
+          </p:cNvPr>
+          <p:cNvSpPr txBox="1"/>
+          <p:nvPr/>
+        </p:nvSpPr>
+        <p:spPr>
+          <a:xfrm>
+            <a:off x="457200" y="182880"/>
+            <a:ext cx="4573240" cy="707886"/>
+          </a:xfrm>
+          <a:prstGeom prst="rect">
+            <a:avLst/>
+          </a:prstGeom>
+          <a:noFill/>
+        </p:spPr>
+        <p:txBody>
+          <a:bodyPr wrap="none">
+            <a:spAutoFit/>
+          </a:bodyPr>
+          <a:lstStyle/>
+          <a:p>
+            <a:pPr>
+              <a:defRPr sz="4000" b="1">
+                <a:solidFill>
+                  <a:srgbClr val="FFFFFF"/>
+                </a:solidFill>
+              </a:defRPr>
+            </a:pPr>
+            <a:r>
+              <a:rPr lang="es-ES" noProof="0" dirty="0"/>
+              <a:t>Capturas adicionales</a:t>
+            </a:r>
+          </a:p>
+        </p:txBody>
+      </p:sp>
+      <p:pic>
+        <p:nvPicPr>
+          <p:cNvPr id="6" name="Imagen 5" descr="Interfaz de usuario gráfica, Aplicación&#10;&#10;El contenido generado por IA puede ser incorrecto.">
+            <a:extLst>
+              <a:ext uri="{FF2B5EF4-FFF2-40B4-BE49-F238E27FC236}">
+                <a16:creationId xmlns:a16="http://schemas.microsoft.com/office/drawing/2014/main" id="{D1890B94-EC06-E719-44A7-6A8CEC6CDE2A}"/>
+              </a:ext>
+            </a:extLst>
+          </p:cNvPr>
+          <p:cNvPicPr>
+            <a:picLocks noChangeAspect="1"/>
+          </p:cNvPicPr>
+          <p:nvPr/>
+        </p:nvPicPr>
+        <p:blipFill>
+          <a:blip r:embed="rId2"/>
+          <a:stretch>
+            <a:fillRect/>
+          </a:stretch>
+        </p:blipFill>
+        <p:spPr>
+          <a:xfrm>
+            <a:off x="1563329" y="1415186"/>
+            <a:ext cx="6017342" cy="3201514"/>
+          </a:xfrm>
+          <a:prstGeom prst="rect">
+            <a:avLst/>
+          </a:prstGeom>
+        </p:spPr>
+      </p:pic>
+      <p:sp>
+        <p:nvSpPr>
+          <p:cNvPr id="7" name="CuadroTexto 6">
+            <a:extLst>
+              <a:ext uri="{FF2B5EF4-FFF2-40B4-BE49-F238E27FC236}">
+                <a16:creationId xmlns:a16="http://schemas.microsoft.com/office/drawing/2014/main" id="{B51245B9-1A11-047A-EAE0-141C297BD04B}"/>
+              </a:ext>
+            </a:extLst>
+          </p:cNvPr>
+          <p:cNvSpPr txBox="1"/>
+          <p:nvPr/>
+        </p:nvSpPr>
+        <p:spPr>
+          <a:xfrm>
+            <a:off x="0" y="1022555"/>
+            <a:ext cx="9144000" cy="338554"/>
+          </a:xfrm>
+          <a:prstGeom prst="rect">
+            <a:avLst/>
+          </a:prstGeom>
+          <a:noFill/>
+        </p:spPr>
+        <p:txBody>
+          <a:bodyPr wrap="square" rtlCol="0">
+            <a:spAutoFit/>
+          </a:bodyPr>
+          <a:lstStyle/>
+          <a:p>
+            <a:pPr algn="ctr"/>
+            <a:r>
+              <a:rPr lang="es-ES" sz="1600" b="1" dirty="0"/>
+              <a:t>DOCUMENTACIÓN</a:t>
+            </a:r>
+          </a:p>
+        </p:txBody>
+      </p:sp>
+      <p:pic>
+        <p:nvPicPr>
+          <p:cNvPr id="8" name="Imagen 7" descr="Aplicación&#10;&#10;El contenido generado por IA puede ser incorrecto.">
+            <a:extLst>
+              <a:ext uri="{FF2B5EF4-FFF2-40B4-BE49-F238E27FC236}">
+                <a16:creationId xmlns:a16="http://schemas.microsoft.com/office/drawing/2014/main" id="{1F27C335-6B19-B118-34D6-6D49F79F83AF}"/>
+              </a:ext>
+            </a:extLst>
+          </p:cNvPr>
+          <p:cNvPicPr>
+            <a:picLocks noChangeAspect="1"/>
+          </p:cNvPicPr>
+          <p:nvPr/>
+        </p:nvPicPr>
+        <p:blipFill>
+          <a:blip r:embed="rId3"/>
+          <a:stretch>
+            <a:fillRect/>
+          </a:stretch>
+        </p:blipFill>
+        <p:spPr>
+          <a:xfrm>
+            <a:off x="1563329" y="4613054"/>
+            <a:ext cx="6017342" cy="1659520"/>
+          </a:xfrm>
+          <a:prstGeom prst="rect">
+            <a:avLst/>
+          </a:prstGeom>
+        </p:spPr>
+      </p:pic>
+    </p:spTree>
+    <p:extLst>
+      <p:ext uri="{BB962C8B-B14F-4D97-AF65-F5344CB8AC3E}">
+        <p14:creationId xmlns:p14="http://schemas.microsoft.com/office/powerpoint/2010/main" val="4133968270"/>
+      </p:ext>
+    </p:extLst>
+  </p:cSld>
+  <p:clrMapOvr>
+    <a:masterClrMapping/>
+  </p:clrMapOvr>
+</p:sld>
+</file>
+
+<file path=ppt/slides/slide11.xml><?xml version="1.0" encoding="utf-8"?>
+<p:sld xmlns:a="http://schemas.openxmlformats.org/drawingml/2006/main" xmlns:r="http://schemas.openxmlformats.org/officeDocument/2006/relationships" xmlns:p="http://schemas.openxmlformats.org/presentationml/2006/main">
+  <p:cSld>
+    <p:spTree>
+      <p:nvGrpSpPr>
+        <p:cNvPr id="1" name="">
+          <a:extLst>
+            <a:ext uri="{FF2B5EF4-FFF2-40B4-BE49-F238E27FC236}">
+              <a16:creationId xmlns:a16="http://schemas.microsoft.com/office/drawing/2014/main" id="{CCC2D9ED-94F5-6E42-6FF0-2DBA411A4608}"/>
+            </a:ext>
+          </a:extLst>
+        </p:cNvPr>
+        <p:cNvGrpSpPr/>
+        <p:nvPr/>
+      </p:nvGrpSpPr>
+      <p:grpSpPr>
+        <a:xfrm>
+          <a:off x="0" y="0"/>
+          <a:ext cx="0" cy="0"/>
+          <a:chOff x="0" y="0"/>
+          <a:chExt cx="0" cy="0"/>
+        </a:xfrm>
+      </p:grpSpPr>
+      <p:sp>
+        <p:nvSpPr>
+          <p:cNvPr id="2" name="Rectangle 1">
+            <a:extLst>
+              <a:ext uri="{FF2B5EF4-FFF2-40B4-BE49-F238E27FC236}">
+                <a16:creationId xmlns:a16="http://schemas.microsoft.com/office/drawing/2014/main" id="{103A7751-14B3-7B3A-3E60-7EE3A6876E7E}"/>
+              </a:ext>
+            </a:extLst>
+          </p:cNvPr>
+          <p:cNvSpPr/>
+          <p:nvPr/>
+        </p:nvSpPr>
+        <p:spPr>
+          <a:xfrm>
+            <a:off x="0" y="0"/>
+            <a:ext cx="9144000" cy="914400"/>
+          </a:xfrm>
+          <a:prstGeom prst="rect">
+            <a:avLst/>
+          </a:prstGeom>
+          <a:solidFill>
+            <a:srgbClr val="1F4E79"/>
+          </a:solidFill>
+          <a:ln>
+            <a:solidFill>
+              <a:srgbClr val="1F4E79"/>
+            </a:solidFill>
+          </a:ln>
+        </p:spPr>
+        <p:style>
+          <a:lnRef idx="1">
+            <a:schemeClr val="accent1"/>
+          </a:lnRef>
+          <a:fillRef idx="3">
+            <a:schemeClr val="accent1"/>
+          </a:fillRef>
+          <a:effectRef idx="2">
+            <a:schemeClr val="accent1"/>
+          </a:effectRef>
+          <a:fontRef idx="minor">
+            <a:schemeClr val="lt1"/>
+          </a:fontRef>
+        </p:style>
+        <p:txBody>
+          <a:bodyPr rtlCol="0" anchor="ctr"/>
+          <a:lstStyle/>
+          <a:p>
+            <a:pPr algn="ctr"/>
+            <a:endParaRPr lang="es-ES" noProof="0" dirty="0"/>
+          </a:p>
+        </p:txBody>
+      </p:sp>
+      <p:sp>
+        <p:nvSpPr>
+          <p:cNvPr id="3" name="TextBox 2">
+            <a:extLst>
+              <a:ext uri="{FF2B5EF4-FFF2-40B4-BE49-F238E27FC236}">
+                <a16:creationId xmlns:a16="http://schemas.microsoft.com/office/drawing/2014/main" id="{868EF7AA-D62E-9B45-00D1-75CE3577AFB9}"/>
+              </a:ext>
+            </a:extLst>
+          </p:cNvPr>
+          <p:cNvSpPr txBox="1"/>
+          <p:nvPr/>
+        </p:nvSpPr>
+        <p:spPr>
+          <a:xfrm>
+            <a:off x="457200" y="182880"/>
+            <a:ext cx="4573240" cy="707886"/>
+          </a:xfrm>
+          <a:prstGeom prst="rect">
+            <a:avLst/>
+          </a:prstGeom>
+          <a:noFill/>
+        </p:spPr>
+        <p:txBody>
+          <a:bodyPr wrap="none">
+            <a:spAutoFit/>
+          </a:bodyPr>
+          <a:lstStyle/>
+          <a:p>
+            <a:pPr>
+              <a:defRPr sz="4000" b="1">
+                <a:solidFill>
+                  <a:srgbClr val="FFFFFF"/>
+                </a:solidFill>
+              </a:defRPr>
+            </a:pPr>
+            <a:r>
+              <a:rPr lang="es-ES" noProof="0" dirty="0"/>
+              <a:t>Capturas adicionales</a:t>
+            </a:r>
+          </a:p>
+        </p:txBody>
+      </p:sp>
+      <p:pic>
+        <p:nvPicPr>
+          <p:cNvPr id="5" name="Imagen 4" descr="Captura de pantalla de un celular&#10;&#10;El contenido generado por IA puede ser incorrecto.">
+            <a:extLst>
+              <a:ext uri="{FF2B5EF4-FFF2-40B4-BE49-F238E27FC236}">
+                <a16:creationId xmlns:a16="http://schemas.microsoft.com/office/drawing/2014/main" id="{A7F72D41-566C-7461-614B-77FE392E06BF}"/>
+              </a:ext>
+            </a:extLst>
+          </p:cNvPr>
+          <p:cNvPicPr>
+            <a:picLocks noChangeAspect="1"/>
+          </p:cNvPicPr>
+          <p:nvPr/>
+        </p:nvPicPr>
+        <p:blipFill>
+          <a:blip r:embed="rId2"/>
+          <a:stretch>
+            <a:fillRect/>
+          </a:stretch>
+        </p:blipFill>
+        <p:spPr>
+          <a:xfrm>
+            <a:off x="0" y="1645406"/>
+            <a:ext cx="9144000" cy="4865046"/>
+          </a:xfrm>
+          <a:prstGeom prst="rect">
+            <a:avLst/>
+          </a:prstGeom>
+        </p:spPr>
+      </p:pic>
+      <p:sp>
+        <p:nvSpPr>
+          <p:cNvPr id="7" name="CuadroTexto 6">
+            <a:extLst>
+              <a:ext uri="{FF2B5EF4-FFF2-40B4-BE49-F238E27FC236}">
+                <a16:creationId xmlns:a16="http://schemas.microsoft.com/office/drawing/2014/main" id="{3BFFCA1E-4B00-54A2-B1D9-195456983FB1}"/>
+              </a:ext>
+            </a:extLst>
+          </p:cNvPr>
+          <p:cNvSpPr txBox="1"/>
+          <p:nvPr/>
+        </p:nvSpPr>
+        <p:spPr>
+          <a:xfrm>
+            <a:off x="0" y="1093311"/>
+            <a:ext cx="9144000" cy="338554"/>
+          </a:xfrm>
+          <a:prstGeom prst="rect">
+            <a:avLst/>
+          </a:prstGeom>
+          <a:noFill/>
+        </p:spPr>
+        <p:txBody>
+          <a:bodyPr wrap="square" rtlCol="0">
+            <a:spAutoFit/>
+          </a:bodyPr>
+          <a:lstStyle/>
+          <a:p>
+            <a:pPr algn="ctr"/>
+            <a:r>
+              <a:rPr lang="es-ES" sz="1600" b="1" dirty="0"/>
+              <a:t>DOCUMENTACIÓN</a:t>
+            </a:r>
+          </a:p>
+        </p:txBody>
+      </p:sp>
+    </p:spTree>
+    <p:extLst>
+      <p:ext uri="{BB962C8B-B14F-4D97-AF65-F5344CB8AC3E}">
+        <p14:creationId xmlns:p14="http://schemas.microsoft.com/office/powerpoint/2010/main" val="1085575870"/>
+      </p:ext>
+    </p:extLst>
+  </p:cSld>
+  <p:clrMapOvr>
+    <a:masterClrMapping/>
+  </p:clrMapOvr>
+</p:sld>
+</file>
+
+<file path=ppt/slides/slide12.xml><?xml version="1.0" encoding="utf-8"?>
+<p:sld xmlns:a="http://schemas.openxmlformats.org/drawingml/2006/main" xmlns:r="http://schemas.openxmlformats.org/officeDocument/2006/relationships" xmlns:p="http://schemas.openxmlformats.org/presentationml/2006/main">
+  <p:cSld>
+    <p:spTree>
+      <p:nvGrpSpPr>
+        <p:cNvPr id="1" name="">
+          <a:extLst>
+            <a:ext uri="{FF2B5EF4-FFF2-40B4-BE49-F238E27FC236}">
+              <a16:creationId xmlns:a16="http://schemas.microsoft.com/office/drawing/2014/main" id="{B3CB4518-735F-8FD6-0781-9116ECE1A1BB}"/>
+            </a:ext>
+          </a:extLst>
+        </p:cNvPr>
+        <p:cNvGrpSpPr/>
+        <p:nvPr/>
+      </p:nvGrpSpPr>
+      <p:grpSpPr>
+        <a:xfrm>
+          <a:off x="0" y="0"/>
+          <a:ext cx="0" cy="0"/>
+          <a:chOff x="0" y="0"/>
+          <a:chExt cx="0" cy="0"/>
+        </a:xfrm>
+      </p:grpSpPr>
+      <p:sp>
+        <p:nvSpPr>
+          <p:cNvPr id="2" name="Rectangle 1">
+            <a:extLst>
+              <a:ext uri="{FF2B5EF4-FFF2-40B4-BE49-F238E27FC236}">
+                <a16:creationId xmlns:a16="http://schemas.microsoft.com/office/drawing/2014/main" id="{DA510697-8046-A679-4FF9-768EBF92F723}"/>
+              </a:ext>
+            </a:extLst>
+          </p:cNvPr>
+          <p:cNvSpPr/>
+          <p:nvPr/>
+        </p:nvSpPr>
+        <p:spPr>
+          <a:xfrm>
+            <a:off x="0" y="0"/>
+            <a:ext cx="9144000" cy="914400"/>
+          </a:xfrm>
+          <a:prstGeom prst="rect">
+            <a:avLst/>
+          </a:prstGeom>
+          <a:solidFill>
+            <a:srgbClr val="1F4E79"/>
+          </a:solidFill>
+          <a:ln>
+            <a:solidFill>
+              <a:srgbClr val="1F4E79"/>
+            </a:solidFill>
+          </a:ln>
+        </p:spPr>
+        <p:style>
+          <a:lnRef idx="1">
+            <a:schemeClr val="accent1"/>
+          </a:lnRef>
+          <a:fillRef idx="3">
+            <a:schemeClr val="accent1"/>
+          </a:fillRef>
+          <a:effectRef idx="2">
+            <a:schemeClr val="accent1"/>
+          </a:effectRef>
+          <a:fontRef idx="minor">
+            <a:schemeClr val="lt1"/>
+          </a:fontRef>
+        </p:style>
+        <p:txBody>
+          <a:bodyPr rtlCol="0" anchor="ctr"/>
+          <a:lstStyle/>
+          <a:p>
+            <a:pPr algn="ctr"/>
+            <a:endParaRPr lang="es-ES" noProof="0" dirty="0"/>
+          </a:p>
+        </p:txBody>
+      </p:sp>
+      <p:sp>
+        <p:nvSpPr>
+          <p:cNvPr id="3" name="TextBox 2">
+            <a:extLst>
+              <a:ext uri="{FF2B5EF4-FFF2-40B4-BE49-F238E27FC236}">
+                <a16:creationId xmlns:a16="http://schemas.microsoft.com/office/drawing/2014/main" id="{87B149BB-2921-EBE1-8890-984BDFF4F196}"/>
+              </a:ext>
+            </a:extLst>
+          </p:cNvPr>
+          <p:cNvSpPr txBox="1"/>
+          <p:nvPr/>
+        </p:nvSpPr>
+        <p:spPr>
+          <a:xfrm>
+            <a:off x="457200" y="182880"/>
+            <a:ext cx="4573240" cy="707886"/>
+          </a:xfrm>
+          <a:prstGeom prst="rect">
+            <a:avLst/>
+          </a:prstGeom>
+          <a:noFill/>
+        </p:spPr>
+        <p:txBody>
+          <a:bodyPr wrap="none">
+            <a:spAutoFit/>
+          </a:bodyPr>
+          <a:lstStyle/>
+          <a:p>
+            <a:pPr>
+              <a:defRPr sz="4000" b="1">
+                <a:solidFill>
+                  <a:srgbClr val="FFFFFF"/>
+                </a:solidFill>
+              </a:defRPr>
+            </a:pPr>
+            <a:r>
+              <a:rPr lang="es-ES" noProof="0" dirty="0"/>
+              <a:t>Capturas adicionales</a:t>
+            </a:r>
+          </a:p>
+        </p:txBody>
+      </p:sp>
+      <p:sp>
+        <p:nvSpPr>
+          <p:cNvPr id="7" name="CuadroTexto 6">
+            <a:extLst>
+              <a:ext uri="{FF2B5EF4-FFF2-40B4-BE49-F238E27FC236}">
+                <a16:creationId xmlns:a16="http://schemas.microsoft.com/office/drawing/2014/main" id="{E2200F2A-E9BF-9CB0-064B-F645E5C9CDC8}"/>
+              </a:ext>
+            </a:extLst>
+          </p:cNvPr>
+          <p:cNvSpPr txBox="1"/>
+          <p:nvPr/>
+        </p:nvSpPr>
+        <p:spPr>
+          <a:xfrm>
+            <a:off x="0" y="1093311"/>
+            <a:ext cx="9144000" cy="338554"/>
+          </a:xfrm>
+          <a:prstGeom prst="rect">
+            <a:avLst/>
+          </a:prstGeom>
+          <a:noFill/>
+        </p:spPr>
+        <p:txBody>
+          <a:bodyPr wrap="square" rtlCol="0">
+            <a:spAutoFit/>
+          </a:bodyPr>
+          <a:lstStyle/>
+          <a:p>
+            <a:pPr algn="ctr"/>
+            <a:r>
+              <a:rPr lang="es-ES" sz="1600" b="1" dirty="0"/>
+              <a:t>DOCUMENTACIÓN</a:t>
+            </a:r>
+          </a:p>
+        </p:txBody>
+      </p:sp>
+      <p:pic>
+        <p:nvPicPr>
+          <p:cNvPr id="4" name="Imagen 3" descr="Interfaz de usuario gráfica, Aplicación, Sitio web&#10;&#10;El contenido generado por IA puede ser incorrecto.">
+            <a:extLst>
+              <a:ext uri="{FF2B5EF4-FFF2-40B4-BE49-F238E27FC236}">
+                <a16:creationId xmlns:a16="http://schemas.microsoft.com/office/drawing/2014/main" id="{67AB3161-996B-6208-DA65-1483D37EF58F}"/>
+              </a:ext>
+            </a:extLst>
+          </p:cNvPr>
+          <p:cNvPicPr>
+            <a:picLocks noChangeAspect="1"/>
+          </p:cNvPicPr>
+          <p:nvPr/>
+        </p:nvPicPr>
+        <p:blipFill>
+          <a:blip r:embed="rId2"/>
+          <a:stretch>
+            <a:fillRect/>
+          </a:stretch>
+        </p:blipFill>
+        <p:spPr>
+          <a:xfrm>
+            <a:off x="0" y="1637815"/>
+            <a:ext cx="9144000" cy="4865046"/>
+          </a:xfrm>
+          <a:prstGeom prst="rect">
+            <a:avLst/>
+          </a:prstGeom>
+        </p:spPr>
+      </p:pic>
+    </p:spTree>
+    <p:extLst>
+      <p:ext uri="{BB962C8B-B14F-4D97-AF65-F5344CB8AC3E}">
+        <p14:creationId xmlns:p14="http://schemas.microsoft.com/office/powerpoint/2010/main" val="130930250"/>
+      </p:ext>
+    </p:extLst>
+  </p:cSld>
+  <p:clrMapOvr>
+    <a:masterClrMapping/>
+  </p:clrMapOvr>
+</p:sld>
+</file>
+
+<file path=ppt/slides/slide13.xml><?xml version="1.0" encoding="utf-8"?>
+<p:sld xmlns:a="http://schemas.openxmlformats.org/drawingml/2006/main" xmlns:r="http://schemas.openxmlformats.org/officeDocument/2006/relationships" xmlns:p="http://schemas.openxmlformats.org/presentationml/2006/main">
+  <p:cSld>
+    <p:spTree>
+      <p:nvGrpSpPr>
+        <p:cNvPr id="1" name="">
+          <a:extLst>
+            <a:ext uri="{FF2B5EF4-FFF2-40B4-BE49-F238E27FC236}">
+              <a16:creationId xmlns:a16="http://schemas.microsoft.com/office/drawing/2014/main" id="{F1C86F48-E85E-20B1-C45F-BD6FA10DC02B}"/>
+            </a:ext>
+          </a:extLst>
+        </p:cNvPr>
+        <p:cNvGrpSpPr/>
+        <p:nvPr/>
+      </p:nvGrpSpPr>
+      <p:grpSpPr>
+        <a:xfrm>
+          <a:off x="0" y="0"/>
+          <a:ext cx="0" cy="0"/>
+          <a:chOff x="0" y="0"/>
+          <a:chExt cx="0" cy="0"/>
+        </a:xfrm>
+      </p:grpSpPr>
+      <p:sp>
+        <p:nvSpPr>
+          <p:cNvPr id="2" name="Rectangle 1">
+            <a:extLst>
+              <a:ext uri="{FF2B5EF4-FFF2-40B4-BE49-F238E27FC236}">
+                <a16:creationId xmlns:a16="http://schemas.microsoft.com/office/drawing/2014/main" id="{F60F4C22-CBD1-03DE-861A-059012F3264A}"/>
+              </a:ext>
+            </a:extLst>
+          </p:cNvPr>
+          <p:cNvSpPr/>
+          <p:nvPr/>
+        </p:nvSpPr>
+        <p:spPr>
+          <a:xfrm>
+            <a:off x="0" y="0"/>
+            <a:ext cx="9144000" cy="914400"/>
+          </a:xfrm>
+          <a:prstGeom prst="rect">
+            <a:avLst/>
+          </a:prstGeom>
+          <a:solidFill>
+            <a:srgbClr val="1F4E79"/>
+          </a:solidFill>
+          <a:ln>
+            <a:solidFill>
+              <a:srgbClr val="1F4E79"/>
+            </a:solidFill>
+          </a:ln>
+        </p:spPr>
+        <p:style>
+          <a:lnRef idx="1">
+            <a:schemeClr val="accent1"/>
+          </a:lnRef>
+          <a:fillRef idx="3">
+            <a:schemeClr val="accent1"/>
+          </a:fillRef>
+          <a:effectRef idx="2">
+            <a:schemeClr val="accent1"/>
+          </a:effectRef>
+          <a:fontRef idx="minor">
+            <a:schemeClr val="lt1"/>
+          </a:fontRef>
+        </p:style>
+        <p:txBody>
+          <a:bodyPr rtlCol="0" anchor="ctr"/>
+          <a:lstStyle/>
+          <a:p>
+            <a:pPr algn="ctr"/>
+            <a:endParaRPr lang="es-ES" noProof="0" dirty="0"/>
+          </a:p>
+        </p:txBody>
+      </p:sp>
+      <p:sp>
+        <p:nvSpPr>
+          <p:cNvPr id="3" name="TextBox 2">
+            <a:extLst>
+              <a:ext uri="{FF2B5EF4-FFF2-40B4-BE49-F238E27FC236}">
+                <a16:creationId xmlns:a16="http://schemas.microsoft.com/office/drawing/2014/main" id="{BCC97626-4D6E-8A80-18CF-85B96F3A1B88}"/>
+              </a:ext>
+            </a:extLst>
+          </p:cNvPr>
+          <p:cNvSpPr txBox="1"/>
+          <p:nvPr/>
+        </p:nvSpPr>
+        <p:spPr>
+          <a:xfrm>
+            <a:off x="457200" y="182880"/>
+            <a:ext cx="4573240" cy="707886"/>
+          </a:xfrm>
+          <a:prstGeom prst="rect">
+            <a:avLst/>
+          </a:prstGeom>
+          <a:noFill/>
+        </p:spPr>
+        <p:txBody>
+          <a:bodyPr wrap="none">
+            <a:spAutoFit/>
+          </a:bodyPr>
+          <a:lstStyle/>
+          <a:p>
+            <a:pPr>
+              <a:defRPr sz="4000" b="1">
+                <a:solidFill>
+                  <a:srgbClr val="FFFFFF"/>
+                </a:solidFill>
+              </a:defRPr>
+            </a:pPr>
+            <a:r>
+              <a:rPr lang="es-ES" noProof="0" dirty="0"/>
+              <a:t>Capturas adicionales</a:t>
+            </a:r>
+          </a:p>
+        </p:txBody>
+      </p:sp>
+      <p:pic>
+        <p:nvPicPr>
+          <p:cNvPr id="8" name="Imagen 7" descr="Captura de pantalla de un celular&#10;&#10;El contenido generado por IA puede ser incorrecto.">
+            <a:extLst>
+              <a:ext uri="{FF2B5EF4-FFF2-40B4-BE49-F238E27FC236}">
+                <a16:creationId xmlns:a16="http://schemas.microsoft.com/office/drawing/2014/main" id="{79D79DF2-7AEF-5AC7-A42B-36EA110C46FC}"/>
+              </a:ext>
+            </a:extLst>
+          </p:cNvPr>
+          <p:cNvPicPr>
+            <a:picLocks noChangeAspect="1"/>
+          </p:cNvPicPr>
+          <p:nvPr/>
+        </p:nvPicPr>
+        <p:blipFill>
+          <a:blip r:embed="rId2"/>
+          <a:stretch>
+            <a:fillRect/>
+          </a:stretch>
+        </p:blipFill>
+        <p:spPr>
+          <a:xfrm>
+            <a:off x="0" y="1657621"/>
+            <a:ext cx="9144000" cy="4860281"/>
+          </a:xfrm>
+          <a:prstGeom prst="rect">
+            <a:avLst/>
+          </a:prstGeom>
+        </p:spPr>
+      </p:pic>
+      <p:sp>
+        <p:nvSpPr>
+          <p:cNvPr id="9" name="CuadroTexto 8">
+            <a:extLst>
+              <a:ext uri="{FF2B5EF4-FFF2-40B4-BE49-F238E27FC236}">
+                <a16:creationId xmlns:a16="http://schemas.microsoft.com/office/drawing/2014/main" id="{3396056C-CDAC-FA97-4A7F-6647E2E5A772}"/>
+              </a:ext>
+            </a:extLst>
+          </p:cNvPr>
+          <p:cNvSpPr txBox="1"/>
+          <p:nvPr/>
+        </p:nvSpPr>
+        <p:spPr>
+          <a:xfrm>
+            <a:off x="0" y="1093311"/>
+            <a:ext cx="9144000" cy="338554"/>
+          </a:xfrm>
+          <a:prstGeom prst="rect">
+            <a:avLst/>
+          </a:prstGeom>
+          <a:noFill/>
+        </p:spPr>
+        <p:txBody>
+          <a:bodyPr wrap="square" rtlCol="0">
+            <a:spAutoFit/>
+          </a:bodyPr>
+          <a:lstStyle/>
+          <a:p>
+            <a:pPr algn="ctr"/>
+            <a:r>
+              <a:rPr lang="es-ES" sz="1600" b="1" dirty="0"/>
+              <a:t>API GATEWAY</a:t>
+            </a:r>
+          </a:p>
+        </p:txBody>
+      </p:sp>
+    </p:spTree>
+    <p:extLst>
+      <p:ext uri="{BB962C8B-B14F-4D97-AF65-F5344CB8AC3E}">
+        <p14:creationId xmlns:p14="http://schemas.microsoft.com/office/powerpoint/2010/main" val="1637937684"/>
+      </p:ext>
+    </p:extLst>
+  </p:cSld>
+  <p:clrMapOvr>
+    <a:masterClrMapping/>
+  </p:clrMapOvr>
+</p:sld>
+</file>
+
+<file path=ppt/slides/slide14.xml><?xml version="1.0" encoding="utf-8"?>
+<p:sld xmlns:a="http://schemas.openxmlformats.org/drawingml/2006/main" xmlns:r="http://schemas.openxmlformats.org/officeDocument/2006/relationships" xmlns:p="http://schemas.openxmlformats.org/presentationml/2006/main">
+  <p:cSld>
+    <p:spTree>
+      <p:nvGrpSpPr>
+        <p:cNvPr id="1" name="">
+          <a:extLst>
+            <a:ext uri="{FF2B5EF4-FFF2-40B4-BE49-F238E27FC236}">
+              <a16:creationId xmlns:a16="http://schemas.microsoft.com/office/drawing/2014/main" id="{4D71B13A-C2E5-7481-70C9-BFF7B2182236}"/>
+            </a:ext>
+          </a:extLst>
+        </p:cNvPr>
+        <p:cNvGrpSpPr/>
+        <p:nvPr/>
+      </p:nvGrpSpPr>
+      <p:grpSpPr>
+        <a:xfrm>
+          <a:off x="0" y="0"/>
+          <a:ext cx="0" cy="0"/>
+          <a:chOff x="0" y="0"/>
+          <a:chExt cx="0" cy="0"/>
+        </a:xfrm>
+      </p:grpSpPr>
+      <p:sp>
+        <p:nvSpPr>
+          <p:cNvPr id="2" name="Rectangle 1">
+            <a:extLst>
+              <a:ext uri="{FF2B5EF4-FFF2-40B4-BE49-F238E27FC236}">
+                <a16:creationId xmlns:a16="http://schemas.microsoft.com/office/drawing/2014/main" id="{9D966B80-942D-2C79-1D96-FE314FFF4B0C}"/>
+              </a:ext>
+            </a:extLst>
+          </p:cNvPr>
+          <p:cNvSpPr/>
+          <p:nvPr/>
+        </p:nvSpPr>
+        <p:spPr>
+          <a:xfrm>
+            <a:off x="0" y="0"/>
+            <a:ext cx="9144000" cy="914400"/>
+          </a:xfrm>
+          <a:prstGeom prst="rect">
+            <a:avLst/>
+          </a:prstGeom>
+          <a:solidFill>
+            <a:srgbClr val="1F4E79"/>
+          </a:solidFill>
+          <a:ln>
+            <a:solidFill>
+              <a:srgbClr val="1F4E79"/>
+            </a:solidFill>
+          </a:ln>
+        </p:spPr>
+        <p:style>
+          <a:lnRef idx="1">
+            <a:schemeClr val="accent1"/>
+          </a:lnRef>
+          <a:fillRef idx="3">
+            <a:schemeClr val="accent1"/>
+          </a:fillRef>
+          <a:effectRef idx="2">
+            <a:schemeClr val="accent1"/>
+          </a:effectRef>
+          <a:fontRef idx="minor">
+            <a:schemeClr val="lt1"/>
+          </a:fontRef>
+        </p:style>
+        <p:txBody>
+          <a:bodyPr rtlCol="0" anchor="ctr"/>
+          <a:lstStyle/>
+          <a:p>
+            <a:pPr algn="ctr"/>
+            <a:endParaRPr lang="es-ES" noProof="0" dirty="0"/>
+          </a:p>
+        </p:txBody>
+      </p:sp>
+      <p:sp>
+        <p:nvSpPr>
+          <p:cNvPr id="3" name="TextBox 2">
+            <a:extLst>
+              <a:ext uri="{FF2B5EF4-FFF2-40B4-BE49-F238E27FC236}">
+                <a16:creationId xmlns:a16="http://schemas.microsoft.com/office/drawing/2014/main" id="{B14ECBC1-D04E-1098-AB2D-8205357561EE}"/>
+              </a:ext>
+            </a:extLst>
+          </p:cNvPr>
+          <p:cNvSpPr txBox="1"/>
+          <p:nvPr/>
+        </p:nvSpPr>
+        <p:spPr>
+          <a:xfrm>
+            <a:off x="457200" y="182880"/>
+            <a:ext cx="4573240" cy="707886"/>
+          </a:xfrm>
+          <a:prstGeom prst="rect">
+            <a:avLst/>
+          </a:prstGeom>
+          <a:noFill/>
+        </p:spPr>
+        <p:txBody>
+          <a:bodyPr wrap="none">
+            <a:spAutoFit/>
+          </a:bodyPr>
+          <a:lstStyle/>
+          <a:p>
+            <a:pPr>
+              <a:defRPr sz="4000" b="1">
+                <a:solidFill>
+                  <a:srgbClr val="FFFFFF"/>
+                </a:solidFill>
+              </a:defRPr>
+            </a:pPr>
+            <a:r>
+              <a:rPr lang="es-ES" noProof="0" dirty="0"/>
+              <a:t>Capturas adicionales</a:t>
+            </a:r>
+          </a:p>
+        </p:txBody>
+      </p:sp>
+      <p:sp>
+        <p:nvSpPr>
+          <p:cNvPr id="9" name="CuadroTexto 8">
+            <a:extLst>
+              <a:ext uri="{FF2B5EF4-FFF2-40B4-BE49-F238E27FC236}">
+                <a16:creationId xmlns:a16="http://schemas.microsoft.com/office/drawing/2014/main" id="{9A2F493E-0A86-0504-BF0F-DF90A7FA2C04}"/>
+              </a:ext>
+            </a:extLst>
+          </p:cNvPr>
+          <p:cNvSpPr txBox="1"/>
+          <p:nvPr/>
+        </p:nvSpPr>
+        <p:spPr>
+          <a:xfrm>
+            <a:off x="0" y="1093311"/>
+            <a:ext cx="9144000" cy="338554"/>
+          </a:xfrm>
+          <a:prstGeom prst="rect">
+            <a:avLst/>
+          </a:prstGeom>
+          <a:noFill/>
+        </p:spPr>
+        <p:txBody>
+          <a:bodyPr wrap="square" rtlCol="0">
+            <a:spAutoFit/>
+          </a:bodyPr>
+          <a:lstStyle/>
+          <a:p>
+            <a:pPr algn="ctr"/>
+            <a:r>
+              <a:rPr lang="es-ES" sz="1600" b="1" dirty="0"/>
+              <a:t>API GATEWAY</a:t>
+            </a:r>
+          </a:p>
+        </p:txBody>
+      </p:sp>
+      <p:pic>
+        <p:nvPicPr>
+          <p:cNvPr id="5" name="Imagen 4" descr="Captura de pantalla de un celular&#10;&#10;El contenido generado por IA puede ser incorrecto.">
+            <a:extLst>
+              <a:ext uri="{FF2B5EF4-FFF2-40B4-BE49-F238E27FC236}">
+                <a16:creationId xmlns:a16="http://schemas.microsoft.com/office/drawing/2014/main" id="{6E27B1A6-3131-38BE-AB33-11FE88584976}"/>
+              </a:ext>
+            </a:extLst>
+          </p:cNvPr>
+          <p:cNvPicPr>
+            <a:picLocks noChangeAspect="1"/>
+          </p:cNvPicPr>
+          <p:nvPr/>
+        </p:nvPicPr>
+        <p:blipFill>
+          <a:blip r:embed="rId2"/>
+          <a:stretch>
+            <a:fillRect/>
+          </a:stretch>
+        </p:blipFill>
+        <p:spPr>
+          <a:xfrm>
+            <a:off x="0" y="1659939"/>
+            <a:ext cx="9144000" cy="4841222"/>
+          </a:xfrm>
+          <a:prstGeom prst="rect">
+            <a:avLst/>
+          </a:prstGeom>
+        </p:spPr>
+      </p:pic>
+    </p:spTree>
+    <p:extLst>
+      <p:ext uri="{BB962C8B-B14F-4D97-AF65-F5344CB8AC3E}">
+        <p14:creationId xmlns:p14="http://schemas.microsoft.com/office/powerpoint/2010/main" val="2155473319"/>
+      </p:ext>
+    </p:extLst>
+  </p:cSld>
+  <p:clrMapOvr>
+    <a:masterClrMapping/>
+  </p:clrMapOvr>
+</p:sld>
+</file>
+
+<file path=ppt/slides/slide15.xml><?xml version="1.0" encoding="utf-8"?>
+<p:sld xmlns:a="http://schemas.openxmlformats.org/drawingml/2006/main" xmlns:r="http://schemas.openxmlformats.org/officeDocument/2006/relationships" xmlns:p="http://schemas.openxmlformats.org/presentationml/2006/main">
+  <p:cSld>
+    <p:spTree>
+      <p:nvGrpSpPr>
+        <p:cNvPr id="1" name="">
+          <a:extLst>
+            <a:ext uri="{FF2B5EF4-FFF2-40B4-BE49-F238E27FC236}">
               <a16:creationId xmlns:a16="http://schemas.microsoft.com/office/drawing/2014/main" id="{35A3F220-0603-5F30-28C4-579FEF38599B}"/>
             </a:ext>
           </a:extLst>
@@ -7607,7 +8622,7 @@
         <p:spPr>
           <a:xfrm>
             <a:off x="548640" y="1097280"/>
-            <a:ext cx="8046720" cy="5339923"/>
+            <a:ext cx="8046720" cy="5355312"/>
           </a:xfrm>
           <a:prstGeom prst="rect">
             <a:avLst/>
@@ -7945,9 +8960,12 @@
               </a:defRPr>
             </a:pPr>
             <a:r>
-              <a:rPr lang="es-ES" noProof="0" dirty="0"/>
-              <a:t>URL</a:t>
-            </a:r>
+              <a:rPr lang="es-ES" dirty="0">
+                <a:hlinkClick r:id="rId2"/>
+              </a:rPr>
+              <a:t>https://drive.google.com/file/d/1XqorDGc-5C1Yj5Pb2dmk6uzF_oAiHNNT/view?usp=sharing</a:t>
+            </a:r>
+            <a:endParaRPr lang="es-ES" dirty="0"/>
           </a:p>
           <a:p>
             <a:pPr>

</xml_diff>